<commit_message>
Change on names to have same format
</commit_message>
<xml_diff>
--- a/Presentations/Presentation Apache Spark.pptx
+++ b/Presentations/Presentation Apache Spark.pptx
@@ -312,7 +312,7 @@
             <a:fld id="{87DE6118-2437-4B30-8E3C-4D2BE6020583}" type="datetimeFigureOut">
               <a:rPr lang="en-US" dirty="0"/>
               <a:pPr/>
-              <a:t>7/22/2020</a:t>
+              <a:t>7/22/20</a:t>
             </a:fld>
             <a:endParaRPr lang="en-US" dirty="0"/>
           </a:p>
@@ -381,7 +381,7 @@
             <a:fld id="{69E57DC2-970A-4B3E-BB1C-7A09969E49DF}" type="slidenum">
               <a:rPr lang="en-US" dirty="0"/>
               <a:pPr/>
-              <a:t>‹N›</a:t>
+              <a:t>‹Nº›</a:t>
             </a:fld>
             <a:endParaRPr lang="en-US" dirty="0"/>
           </a:p>
@@ -638,7 +638,7 @@
           <a:p>
             <a:fld id="{87DE6118-2437-4B30-8E3C-4D2BE6020583}" type="datetimeFigureOut">
               <a:rPr lang="en-US" dirty="0"/>
-              <a:t>7/22/2020</a:t>
+              <a:t>7/22/20</a:t>
             </a:fld>
             <a:endParaRPr lang="en-US" dirty="0"/>
           </a:p>
@@ -680,7 +680,7 @@
           <a:p>
             <a:fld id="{69E57DC2-970A-4B3E-BB1C-7A09969E49DF}" type="slidenum">
               <a:rPr lang="en-US" dirty="0"/>
-              <a:t>‹N›</a:t>
+              <a:t>‹Nº›</a:t>
             </a:fld>
             <a:endParaRPr lang="en-US" dirty="0"/>
           </a:p>
@@ -813,7 +813,7 @@
           <a:p>
             <a:fld id="{87DE6118-2437-4B30-8E3C-4D2BE6020583}" type="datetimeFigureOut">
               <a:rPr lang="en-US" dirty="0"/>
-              <a:t>7/22/2020</a:t>
+              <a:t>7/22/20</a:t>
             </a:fld>
             <a:endParaRPr lang="en-US" dirty="0"/>
           </a:p>
@@ -855,7 +855,7 @@
           <a:p>
             <a:fld id="{69E57DC2-970A-4B3E-BB1C-7A09969E49DF}" type="slidenum">
               <a:rPr lang="en-US" dirty="0"/>
-              <a:t>‹N›</a:t>
+              <a:t>‹Nº›</a:t>
             </a:fld>
             <a:endParaRPr lang="en-US" dirty="0"/>
           </a:p>
@@ -978,7 +978,7 @@
           <a:p>
             <a:fld id="{87DE6118-2437-4B30-8E3C-4D2BE6020583}" type="datetimeFigureOut">
               <a:rPr lang="en-US" dirty="0"/>
-              <a:t>7/22/2020</a:t>
+              <a:t>7/22/20</a:t>
             </a:fld>
             <a:endParaRPr lang="en-US" dirty="0"/>
           </a:p>
@@ -1020,7 +1020,7 @@
           <a:p>
             <a:fld id="{69E57DC2-970A-4B3E-BB1C-7A09969E49DF}" type="slidenum">
               <a:rPr lang="en-US" dirty="0"/>
-              <a:t>‹N›</a:t>
+              <a:t>‹Nº›</a:t>
             </a:fld>
             <a:endParaRPr lang="en-US" dirty="0"/>
           </a:p>
@@ -1251,7 +1251,7 @@
             <a:fld id="{87DE6118-2437-4B30-8E3C-4D2BE6020583}" type="datetimeFigureOut">
               <a:rPr lang="en-US" dirty="0"/>
               <a:pPr/>
-              <a:t>7/22/2020</a:t>
+              <a:t>7/22/20</a:t>
             </a:fld>
             <a:endParaRPr lang="en-US" dirty="0"/>
           </a:p>
@@ -1320,7 +1320,7 @@
             <a:fld id="{69E57DC2-970A-4B3E-BB1C-7A09969E49DF}" type="slidenum">
               <a:rPr lang="en-US" dirty="0"/>
               <a:pPr/>
-              <a:t>‹N›</a:t>
+              <a:t>‹Nº›</a:t>
             </a:fld>
             <a:endParaRPr lang="en-US" dirty="0"/>
           </a:p>
@@ -1641,7 +1641,7 @@
           <a:p>
             <a:fld id="{87DE6118-2437-4B30-8E3C-4D2BE6020583}" type="datetimeFigureOut">
               <a:rPr lang="en-US" dirty="0"/>
-              <a:t>7/22/2020</a:t>
+              <a:t>7/22/20</a:t>
             </a:fld>
             <a:endParaRPr lang="en-US" dirty="0"/>
           </a:p>
@@ -1683,7 +1683,7 @@
           <a:p>
             <a:fld id="{69E57DC2-970A-4B3E-BB1C-7A09969E49DF}" type="slidenum">
               <a:rPr lang="en-US" dirty="0"/>
-              <a:t>‹N›</a:t>
+              <a:t>‹Nº›</a:t>
             </a:fld>
             <a:endParaRPr lang="en-US" dirty="0"/>
           </a:p>
@@ -2113,7 +2113,7 @@
           <a:p>
             <a:fld id="{87DE6118-2437-4B30-8E3C-4D2BE6020583}" type="datetimeFigureOut">
               <a:rPr lang="en-US" dirty="0"/>
-              <a:t>7/22/2020</a:t>
+              <a:t>7/22/20</a:t>
             </a:fld>
             <a:endParaRPr lang="en-US" dirty="0"/>
           </a:p>
@@ -2155,7 +2155,7 @@
           <a:p>
             <a:fld id="{69E57DC2-970A-4B3E-BB1C-7A09969E49DF}" type="slidenum">
               <a:rPr lang="en-US" dirty="0"/>
-              <a:t>‹N›</a:t>
+              <a:t>‹Nº›</a:t>
             </a:fld>
             <a:endParaRPr lang="en-US" dirty="0"/>
           </a:p>
@@ -2226,7 +2226,7 @@
           <a:p>
             <a:fld id="{87DE6118-2437-4B30-8E3C-4D2BE6020583}" type="datetimeFigureOut">
               <a:rPr lang="en-US" dirty="0"/>
-              <a:t>7/22/2020</a:t>
+              <a:t>7/22/20</a:t>
             </a:fld>
             <a:endParaRPr lang="en-US" dirty="0"/>
           </a:p>
@@ -2268,7 +2268,7 @@
           <a:p>
             <a:fld id="{69E57DC2-970A-4B3E-BB1C-7A09969E49DF}" type="slidenum">
               <a:rPr lang="en-US" dirty="0"/>
-              <a:t>‹N›</a:t>
+              <a:t>‹Nº›</a:t>
             </a:fld>
             <a:endParaRPr lang="en-US" dirty="0"/>
           </a:p>
@@ -2316,7 +2316,7 @@
           <a:p>
             <a:fld id="{87DE6118-2437-4B30-8E3C-4D2BE6020583}" type="datetimeFigureOut">
               <a:rPr lang="en-US" dirty="0"/>
-              <a:t>7/22/2020</a:t>
+              <a:t>7/22/20</a:t>
             </a:fld>
             <a:endParaRPr lang="en-US" dirty="0"/>
           </a:p>
@@ -2358,7 +2358,7 @@
           <a:p>
             <a:fld id="{69E57DC2-970A-4B3E-BB1C-7A09969E49DF}" type="slidenum">
               <a:rPr lang="en-US" dirty="0"/>
-              <a:t>‹N›</a:t>
+              <a:t>‹Nº›</a:t>
             </a:fld>
             <a:endParaRPr lang="en-US" dirty="0"/>
           </a:p>
@@ -2658,7 +2658,7 @@
             <a:fld id="{87DE6118-2437-4B30-8E3C-4D2BE6020583}" type="datetimeFigureOut">
               <a:rPr lang="en-US" dirty="0"/>
               <a:pPr/>
-              <a:t>7/22/2020</a:t>
+              <a:t>7/22/20</a:t>
             </a:fld>
             <a:endParaRPr lang="en-US" dirty="0"/>
           </a:p>
@@ -2727,7 +2727,7 @@
             <a:fld id="{69E57DC2-970A-4B3E-BB1C-7A09969E49DF}" type="slidenum">
               <a:rPr lang="en-US" dirty="0"/>
               <a:pPr/>
-              <a:t>‹N›</a:t>
+              <a:t>‹Nº›</a:t>
             </a:fld>
             <a:endParaRPr lang="en-US" dirty="0"/>
           </a:p>
@@ -3043,7 +3043,7 @@
             <a:fld id="{87DE6118-2437-4B30-8E3C-4D2BE6020583}" type="datetimeFigureOut">
               <a:rPr lang="en-US" dirty="0"/>
               <a:pPr/>
-              <a:t>7/22/2020</a:t>
+              <a:t>7/22/20</a:t>
             </a:fld>
             <a:endParaRPr lang="en-US" dirty="0"/>
           </a:p>
@@ -3112,7 +3112,7 @@
             <a:fld id="{69E57DC2-970A-4B3E-BB1C-7A09969E49DF}" type="slidenum">
               <a:rPr lang="en-US" dirty="0"/>
               <a:pPr/>
-              <a:t>‹N›</a:t>
+              <a:t>‹Nº›</a:t>
             </a:fld>
             <a:endParaRPr lang="en-US" dirty="0"/>
           </a:p>
@@ -3318,7 +3318,7 @@
             <a:fld id="{87DE6118-2437-4B30-8E3C-4D2BE6020583}" type="datetimeFigureOut">
               <a:rPr lang="en-US" dirty="0"/>
               <a:pPr/>
-              <a:t>7/22/2020</a:t>
+              <a:t>7/22/20</a:t>
             </a:fld>
             <a:endParaRPr lang="en-US" dirty="0"/>
           </a:p>
@@ -3393,7 +3393,7 @@
             <a:fld id="{69E57DC2-970A-4B3E-BB1C-7A09969E49DF}" type="slidenum">
               <a:rPr lang="en-US" dirty="0"/>
               <a:pPr/>
-              <a:t>‹N›</a:t>
+              <a:t>‹Nº›</a:t>
             </a:fld>
             <a:endParaRPr lang="en-US" dirty="0"/>
           </a:p>
@@ -3871,62 +3871,58 @@
         </p:spPr>
         <p:txBody>
           <a:bodyPr vert="horz" lIns="91440" tIns="45720" rIns="91440" bIns="45720" rtlCol="0" anchor="t">
-            <a:normAutofit fontScale="92500" lnSpcReduction="10000"/>
+            <a:normAutofit fontScale="70000" lnSpcReduction="20000"/>
           </a:bodyPr>
           <a:lstStyle/>
           <a:p>
             <a:r>
-              <a:rPr lang="en-US" dirty="0">
-                <a:ea typeface="+mn-lt"/>
-                <a:cs typeface="+mn-lt"/>
-              </a:rPr>
-              <a:t>Saúl </a:t>
-            </a:r>
-            <a:r>
-              <a:rPr lang="en-US" dirty="0" err="1">
-                <a:ea typeface="+mn-lt"/>
-                <a:cs typeface="+mn-lt"/>
-              </a:rPr>
-              <a:t>Almazán</a:t>
-            </a:r>
-            <a:r>
-              <a:rPr lang="en-US" dirty="0">
-                <a:ea typeface="+mn-lt"/>
-                <a:cs typeface="+mn-lt"/>
-              </a:rPr>
-              <a:t> del Pie</a:t>
+              <a:rPr lang="es-ES" b="1" dirty="0"/>
+              <a:t>Middleware Technologies </a:t>
+            </a:r>
+            <a:r>
+              <a:rPr lang="es-ES" b="1" dirty="0" err="1"/>
+              <a:t>for</a:t>
+            </a:r>
+            <a:r>
+              <a:rPr lang="es-ES" b="1" dirty="0"/>
+              <a:t> </a:t>
+            </a:r>
+            <a:r>
+              <a:rPr lang="es-ES" b="1" dirty="0" err="1"/>
+              <a:t>Distributed</a:t>
+            </a:r>
+            <a:r>
+              <a:rPr lang="es-ES" b="1" dirty="0"/>
+              <a:t> </a:t>
+            </a:r>
+            <a:r>
+              <a:rPr lang="es-ES" b="1" dirty="0" err="1"/>
+              <a:t>Systems</a:t>
+            </a:r>
+            <a:r>
+              <a:rPr lang="es-ES" b="1" dirty="0"/>
+              <a:t> 2020</a:t>
+            </a:r>
+          </a:p>
+          <a:p>
+            <a:r>
+              <a:rPr lang="es-ES" dirty="0"/>
+              <a:t>Saúl Almazán del Pie</a:t>
+            </a:r>
+            <a:endParaRPr lang="es-ES" b="1" dirty="0"/>
+          </a:p>
+          <a:p>
+            <a:r>
+              <a:rPr lang="es-ES" dirty="0"/>
+              <a:t>Marina Alonso-Cortés</a:t>
+            </a:r>
+          </a:p>
+          <a:p>
+            <a:r>
+              <a:rPr lang="es-ES"/>
+              <a:t>Jorge Santisteban</a:t>
             </a:r>
             <a:endParaRPr lang="es-ES" dirty="0"/>
-          </a:p>
-          <a:p>
-            <a:r>
-              <a:rPr lang="en-US" dirty="0">
-                <a:ea typeface="+mn-lt"/>
-                <a:cs typeface="+mn-lt"/>
-              </a:rPr>
-              <a:t>Marina Alonso-Cortés </a:t>
-            </a:r>
-            <a:r>
-              <a:rPr lang="en-US" dirty="0" err="1">
-                <a:ea typeface="+mn-lt"/>
-                <a:cs typeface="+mn-lt"/>
-              </a:rPr>
-              <a:t>Lladó</a:t>
-            </a:r>
-            <a:endParaRPr lang="en-US" dirty="0" err="1"/>
-          </a:p>
-          <a:p>
-            <a:r>
-              <a:rPr lang="en-US" dirty="0">
-                <a:ea typeface="+mn-lt"/>
-                <a:cs typeface="+mn-lt"/>
-              </a:rPr>
-              <a:t>Jorge Santisteban Rivas</a:t>
-            </a:r>
-            <a:endParaRPr lang="en-US" dirty="0"/>
-          </a:p>
-          <a:p>
-            <a:endParaRPr lang="en-US" dirty="0"/>
           </a:p>
         </p:txBody>
       </p:sp>

</xml_diff>